<commit_message>
Added word document and wrote domain part
</commit_message>
<xml_diff>
--- a/First_Delivery/Lab02-PresentationTemplate.pptx
+++ b/First_Delivery/Lab02-PresentationTemplate.pptx
@@ -219,7 +219,7 @@
           <a:p>
             <a:fld id="{745C36E7-9E00-462E-80A3-32F2BE615C7A}" type="datetimeFigureOut">
               <a:rPr lang="en-US" smtClean="0"/>
-              <a:t>9/25/2019</a:t>
+              <a:t>30-Sep-19</a:t>
             </a:fld>
             <a:endParaRPr lang="en-US"/>
           </a:p>
@@ -385,7 +385,7 @@
             <a:fld id="{01F3E309-ED8D-4193-99AF-E5EA90965E98}" type="datetimeFigureOut">
               <a:rPr lang="en-US" smtClean="0"/>
               <a:pPr/>
-              <a:t>9/25/2019</a:t>
+              <a:t>30-Sep-19</a:t>
             </a:fld>
             <a:endParaRPr lang="en-US"/>
           </a:p>
@@ -1487,7 +1487,7 @@
             <a:fld id="{F3CC9924-33BC-4796-B0F9-D37DB5D899BF}" type="datetimeFigureOut">
               <a:rPr lang="pt-PT" smtClean="0"/>
               <a:pPr/>
-              <a:t>25/09/2019</a:t>
+              <a:t>30/09/2019</a:t>
             </a:fld>
             <a:endParaRPr lang="pt-PT"/>
           </a:p>
@@ -3306,9 +3306,7 @@
           <a:prstGeom prst="rect">
             <a:avLst/>
           </a:prstGeom>
-          <a:solidFill>
-            <a:schemeClr val="bg1"/>
-          </a:solidFill>
+          <a:noFill/>
           <a:ln>
             <a:noFill/>
           </a:ln>

</xml_diff>